<commit_message>
Added sqli and xss
</commit_message>
<xml_diff>
--- a/lessons/Fundamental_Concepts_of_AppSec/AppSecLecture.pptx
+++ b/lessons/Fundamental_Concepts_of_AppSec/AppSecLecture.pptx
@@ -13,8 +13,8 @@
     <p:sldId id="269" r:id="rId7"/>
     <p:sldId id="258" r:id="rId8"/>
     <p:sldId id="261" r:id="rId9"/>
-    <p:sldId id="259" r:id="rId10"/>
-    <p:sldId id="266" r:id="rId11"/>
+    <p:sldId id="266" r:id="rId10"/>
+    <p:sldId id="259" r:id="rId11"/>
     <p:sldId id="260" r:id="rId12"/>
     <p:sldId id="264" r:id="rId13"/>
     <p:sldId id="267" r:id="rId14"/>
@@ -13281,14 +13281,6 @@
 <file path=ppt/slides/slide10.xml><?xml version="1.0" encoding="utf-8"?>
 <p:sld xmlns:a="http://schemas.openxmlformats.org/drawingml/2006/main" xmlns:r="http://schemas.openxmlformats.org/officeDocument/2006/relationships" xmlns:p="http://schemas.openxmlformats.org/presentationml/2006/main">
   <p:cSld>
-    <p:bg>
-      <p:bgPr>
-        <a:solidFill>
-          <a:schemeClr val="bg1"/>
-        </a:solidFill>
-        <a:effectLst/>
-      </p:bgPr>
-    </p:bg>
     <p:spTree>
       <p:nvGrpSpPr>
         <p:cNvPr id="1" name=""/>
@@ -13303,378 +13295,12 @@
           <a:chExt cx="0" cy="0"/>
         </a:xfrm>
       </p:grpSpPr>
-      <p:grpSp>
-        <p:nvGrpSpPr>
-          <p:cNvPr id="55" name="Group 54">
-            <a:extLst>
-              <a:ext uri="{FF2B5EF4-FFF2-40B4-BE49-F238E27FC236}">
-                <a16:creationId xmlns:a16="http://schemas.microsoft.com/office/drawing/2014/main" id="{4091D54B-59AB-4A5E-8E9E-0421BD66D4FB}"/>
-              </a:ext>
-              <a:ext uri="{C183D7F6-B498-43B3-948B-1728B52AA6E4}">
-                <adec:decorative xmlns:adec="http://schemas.microsoft.com/office/drawing/2017/decorative" val="1"/>
-              </a:ext>
-            </a:extLst>
-          </p:cNvPr>
-          <p:cNvGrpSpPr>
-            <a:grpSpLocks noGrp="1" noUngrp="1" noRot="1" noChangeAspect="1" noMove="1" noResize="1"/>
-          </p:cNvGrpSpPr>
-          <p:nvPr>
-            <p:extLst>
-              <p:ext uri="{386F3935-93C4-4BCD-93E2-E3B085C9AB24}">
-                <p16:designElem xmlns:p16="http://schemas.microsoft.com/office/powerpoint/2015/main" val="1"/>
-              </p:ext>
-            </p:extLst>
-          </p:nvPr>
-        </p:nvGrpSpPr>
-        <p:grpSpPr>
-          <a:xfrm>
-            <a:off x="0" y="0"/>
-            <a:ext cx="12192000" cy="6858000"/>
-            <a:chOff x="0" y="0"/>
-            <a:chExt cx="12192000" cy="6858000"/>
-          </a:xfrm>
-        </p:grpSpPr>
-        <p:sp>
-          <p:nvSpPr>
-            <p:cNvPr id="56" name="Rectangle 55">
-              <a:extLst>
-                <a:ext uri="{FF2B5EF4-FFF2-40B4-BE49-F238E27FC236}">
-                  <a16:creationId xmlns:a16="http://schemas.microsoft.com/office/drawing/2014/main" id="{547CE62E-FFFD-4A1F-BA78-C3B89C36FCA5}"/>
-                </a:ext>
-                <a:ext uri="{C183D7F6-B498-43B3-948B-1728B52AA6E4}">
-                  <adec:decorative xmlns:adec="http://schemas.microsoft.com/office/drawing/2017/decorative" val="1"/>
-                </a:ext>
-              </a:extLst>
-            </p:cNvPr>
-            <p:cNvSpPr/>
-            <p:nvPr>
-              <p:extLst>
-                <p:ext uri="{386F3935-93C4-4BCD-93E2-E3B085C9AB24}">
-                  <p16:designElem xmlns:p16="http://schemas.microsoft.com/office/powerpoint/2015/main" val="1"/>
-                </p:ext>
-              </p:extLst>
-            </p:nvPr>
-          </p:nvSpPr>
-          <p:spPr>
-            <a:xfrm>
-              <a:off x="0" y="0"/>
-              <a:ext cx="12192000" cy="6858000"/>
-            </a:xfrm>
-            <a:prstGeom prst="rect">
-              <a:avLst/>
-            </a:prstGeom>
-            <a:blipFill>
-              <a:blip r:embed="rId2">
-                <a:duotone>
-                  <a:schemeClr val="dk2">
-                    <a:shade val="69000"/>
-                    <a:hueMod val="91000"/>
-                    <a:satMod val="164000"/>
-                    <a:lumMod val="74000"/>
-                  </a:schemeClr>
-                  <a:schemeClr val="dk2">
-                    <a:hueMod val="124000"/>
-                    <a:satMod val="140000"/>
-                    <a:lumMod val="142000"/>
-                  </a:schemeClr>
-                </a:duotone>
-              </a:blip>
-              <a:stretch>
-                <a:fillRect/>
-              </a:stretch>
-            </a:blipFill>
-            <a:ln>
-              <a:noFill/>
-            </a:ln>
-          </p:spPr>
-          <p:style>
-            <a:lnRef idx="2">
-              <a:schemeClr val="accent1">
-                <a:shade val="50000"/>
-              </a:schemeClr>
-            </a:lnRef>
-            <a:fillRef idx="1">
-              <a:schemeClr val="accent1"/>
-            </a:fillRef>
-            <a:effectRef idx="0">
-              <a:schemeClr val="accent1"/>
-            </a:effectRef>
-            <a:fontRef idx="minor">
-              <a:schemeClr val="lt1"/>
-            </a:fontRef>
-          </p:style>
-        </p:sp>
-        <p:sp>
-          <p:nvSpPr>
-            <p:cNvPr id="57" name="Freeform 5">
-              <a:extLst>
-                <a:ext uri="{FF2B5EF4-FFF2-40B4-BE49-F238E27FC236}">
-                  <a16:creationId xmlns:a16="http://schemas.microsoft.com/office/drawing/2014/main" id="{AE51FD27-6B6A-4D21-BF22-245DA9BD0B3E}"/>
-                </a:ext>
-                <a:ext uri="{C183D7F6-B498-43B3-948B-1728B52AA6E4}">
-                  <adec:decorative xmlns:adec="http://schemas.microsoft.com/office/drawing/2017/decorative" val="1"/>
-                </a:ext>
-              </a:extLst>
-            </p:cNvPr>
-            <p:cNvSpPr>
-              <a:spLocks noEditPoints="1"/>
-            </p:cNvSpPr>
-            <p:nvPr>
-              <p:extLst>
-                <p:ext uri="{386F3935-93C4-4BCD-93E2-E3B085C9AB24}">
-                  <p16:designElem xmlns:p16="http://schemas.microsoft.com/office/powerpoint/2015/main" val="1"/>
-                </p:ext>
-              </p:extLst>
-            </p:nvPr>
-          </p:nvSpPr>
-          <p:spPr bwMode="gray">
-            <a:xfrm>
-              <a:off x="0" y="1587"/>
-              <a:ext cx="12192000" cy="6856413"/>
-            </a:xfrm>
-            <a:custGeom>
-              <a:avLst/>
-              <a:gdLst/>
-              <a:ahLst/>
-              <a:cxnLst/>
-              <a:rect l="0" t="0" r="r" b="b"/>
-              <a:pathLst>
-                <a:path w="15356" h="8638">
-                  <a:moveTo>
-                    <a:pt x="0" y="0"/>
-                  </a:moveTo>
-                  <a:lnTo>
-                    <a:pt x="0" y="8638"/>
-                  </a:lnTo>
-                  <a:lnTo>
-                    <a:pt x="15356" y="8638"/>
-                  </a:lnTo>
-                  <a:lnTo>
-                    <a:pt x="15356" y="0"/>
-                  </a:lnTo>
-                  <a:lnTo>
-                    <a:pt x="0" y="0"/>
-                  </a:lnTo>
-                  <a:close/>
-                  <a:moveTo>
-                    <a:pt x="14748" y="8038"/>
-                  </a:moveTo>
-                  <a:lnTo>
-                    <a:pt x="600" y="8038"/>
-                  </a:lnTo>
-                  <a:lnTo>
-                    <a:pt x="600" y="592"/>
-                  </a:lnTo>
-                  <a:lnTo>
-                    <a:pt x="14748" y="592"/>
-                  </a:lnTo>
-                  <a:lnTo>
-                    <a:pt x="14748" y="8038"/>
-                  </a:lnTo>
-                  <a:close/>
-                </a:path>
-              </a:pathLst>
-            </a:custGeom>
-            <a:solidFill>
-              <a:schemeClr val="bg1"/>
-            </a:solidFill>
-            <a:ln>
-              <a:noFill/>
-            </a:ln>
-          </p:spPr>
-        </p:sp>
-      </p:grpSp>
-      <p:sp>
-        <p:nvSpPr>
-          <p:cNvPr id="59" name="Rectangle 58">
-            <a:extLst>
-              <a:ext uri="{FF2B5EF4-FFF2-40B4-BE49-F238E27FC236}">
-                <a16:creationId xmlns:a16="http://schemas.microsoft.com/office/drawing/2014/main" id="{B8144315-1C5A-4185-A952-25D98D303D46}"/>
-              </a:ext>
-              <a:ext uri="{C183D7F6-B498-43B3-948B-1728B52AA6E4}">
-                <adec:decorative xmlns:adec="http://schemas.microsoft.com/office/drawing/2017/decorative" val="1"/>
-              </a:ext>
-            </a:extLst>
-          </p:cNvPr>
-          <p:cNvSpPr>
-            <a:spLocks noGrp="1" noRot="1" noChangeAspect="1" noMove="1" noResize="1" noEditPoints="1" noAdjustHandles="1" noChangeArrowheads="1" noChangeShapeType="1" noTextEdit="1"/>
-          </p:cNvSpPr>
-          <p:nvPr>
-            <p:extLst>
-              <p:ext uri="{386F3935-93C4-4BCD-93E2-E3B085C9AB24}">
-                <p16:designElem xmlns:p16="http://schemas.microsoft.com/office/powerpoint/2015/main" val="1"/>
-              </p:ext>
-            </p:extLst>
-          </p:nvPr>
-        </p:nvSpPr>
-        <p:spPr>
-          <a:xfrm>
-            <a:off x="10437812" y="0"/>
-            <a:ext cx="685800" cy="1143000"/>
-          </a:xfrm>
-          <a:prstGeom prst="rect">
-            <a:avLst/>
-          </a:prstGeom>
-          <a:solidFill>
-            <a:schemeClr val="accent1"/>
-          </a:solidFill>
-          <a:ln>
-            <a:noFill/>
-          </a:ln>
-        </p:spPr>
-        <p:style>
-          <a:lnRef idx="1">
-            <a:schemeClr val="accent1"/>
-          </a:lnRef>
-          <a:fillRef idx="3">
-            <a:schemeClr val="accent1"/>
-          </a:fillRef>
-          <a:effectRef idx="2">
-            <a:schemeClr val="accent1"/>
-          </a:effectRef>
-          <a:fontRef idx="minor">
-            <a:schemeClr val="lt1"/>
-          </a:fontRef>
-        </p:style>
-      </p:sp>
-      <p:sp>
-        <p:nvSpPr>
-          <p:cNvPr id="61" name="Freeform 5">
-            <a:extLst>
-              <a:ext uri="{FF2B5EF4-FFF2-40B4-BE49-F238E27FC236}">
-                <a16:creationId xmlns:a16="http://schemas.microsoft.com/office/drawing/2014/main" id="{11CAC6F2-0806-417B-BF5D-5AEF6195FA49}"/>
-              </a:ext>
-              <a:ext uri="{C183D7F6-B498-43B3-948B-1728B52AA6E4}">
-                <adec:decorative xmlns:adec="http://schemas.microsoft.com/office/drawing/2017/decorative" val="1"/>
-              </a:ext>
-            </a:extLst>
-          </p:cNvPr>
-          <p:cNvSpPr>
-            <a:spLocks noGrp="1" noRot="1" noChangeAspect="1" noMove="1" noResize="1" noEditPoints="1" noAdjustHandles="1" noChangeArrowheads="1" noChangeShapeType="1" noTextEdit="1"/>
-          </p:cNvSpPr>
-          <p:nvPr>
-            <p:extLst>
-              <p:ext uri="{386F3935-93C4-4BCD-93E2-E3B085C9AB24}">
-                <p16:designElem xmlns:p16="http://schemas.microsoft.com/office/powerpoint/2015/main" val="1"/>
-              </p:ext>
-            </p:extLst>
-          </p:nvPr>
-        </p:nvSpPr>
-        <p:spPr bwMode="gray">
-          <a:xfrm>
-            <a:off x="0" y="1587"/>
-            <a:ext cx="12192000" cy="6856413"/>
-          </a:xfrm>
-          <a:custGeom>
-            <a:avLst/>
-            <a:gdLst/>
-            <a:ahLst/>
-            <a:cxnLst/>
-            <a:rect l="0" t="0" r="r" b="b"/>
-            <a:pathLst>
-              <a:path w="15356" h="8638">
-                <a:moveTo>
-                  <a:pt x="0" y="0"/>
-                </a:moveTo>
-                <a:lnTo>
-                  <a:pt x="0" y="8638"/>
-                </a:lnTo>
-                <a:lnTo>
-                  <a:pt x="15356" y="8638"/>
-                </a:lnTo>
-                <a:lnTo>
-                  <a:pt x="15356" y="0"/>
-                </a:lnTo>
-                <a:lnTo>
-                  <a:pt x="0" y="0"/>
-                </a:lnTo>
-                <a:close/>
-                <a:moveTo>
-                  <a:pt x="14748" y="8038"/>
-                </a:moveTo>
-                <a:lnTo>
-                  <a:pt x="600" y="8038"/>
-                </a:lnTo>
-                <a:lnTo>
-                  <a:pt x="600" y="592"/>
-                </a:lnTo>
-                <a:lnTo>
-                  <a:pt x="14748" y="592"/>
-                </a:lnTo>
-                <a:lnTo>
-                  <a:pt x="14748" y="8038"/>
-                </a:lnTo>
-                <a:close/>
-              </a:path>
-            </a:pathLst>
-          </a:custGeom>
-          <a:solidFill>
-            <a:schemeClr val="tx1"/>
-          </a:solidFill>
-          <a:ln>
-            <a:noFill/>
-          </a:ln>
-        </p:spPr>
-      </p:sp>
-      <p:sp>
-        <p:nvSpPr>
-          <p:cNvPr id="63" name="Rectangle 62">
-            <a:extLst>
-              <a:ext uri="{FF2B5EF4-FFF2-40B4-BE49-F238E27FC236}">
-                <a16:creationId xmlns:a16="http://schemas.microsoft.com/office/drawing/2014/main" id="{D4723B02-0AAB-4F6E-BA41-8ED99D559D93}"/>
-              </a:ext>
-              <a:ext uri="{C183D7F6-B498-43B3-948B-1728B52AA6E4}">
-                <adec:decorative xmlns:adec="http://schemas.microsoft.com/office/drawing/2017/decorative" val="1"/>
-              </a:ext>
-            </a:extLst>
-          </p:cNvPr>
-          <p:cNvSpPr>
-            <a:spLocks noGrp="1" noRot="1" noChangeAspect="1" noMove="1" noResize="1" noEditPoints="1" noAdjustHandles="1" noChangeArrowheads="1" noChangeShapeType="1" noTextEdit="1"/>
-          </p:cNvSpPr>
-          <p:nvPr>
-            <p:extLst>
-              <p:ext uri="{386F3935-93C4-4BCD-93E2-E3B085C9AB24}">
-                <p16:designElem xmlns:p16="http://schemas.microsoft.com/office/powerpoint/2015/main" val="1"/>
-              </p:ext>
-            </p:extLst>
-          </p:nvPr>
-        </p:nvSpPr>
-        <p:spPr>
-          <a:xfrm>
-            <a:off x="10437812" y="0"/>
-            <a:ext cx="685800" cy="1143000"/>
-          </a:xfrm>
-          <a:prstGeom prst="rect">
-            <a:avLst/>
-          </a:prstGeom>
-          <a:solidFill>
-            <a:schemeClr val="accent1"/>
-          </a:solidFill>
-          <a:ln>
-            <a:noFill/>
-          </a:ln>
-        </p:spPr>
-        <p:style>
-          <a:lnRef idx="1">
-            <a:schemeClr val="accent1"/>
-          </a:lnRef>
-          <a:fillRef idx="3">
-            <a:schemeClr val="accent1"/>
-          </a:fillRef>
-          <a:effectRef idx="2">
-            <a:schemeClr val="accent1"/>
-          </a:effectRef>
-          <a:fontRef idx="minor">
-            <a:schemeClr val="lt1"/>
-          </a:fontRef>
-        </p:style>
-      </p:sp>
       <p:sp>
         <p:nvSpPr>
           <p:cNvPr id="2" name="Title 1">
             <a:extLst>
               <a:ext uri="{FF2B5EF4-FFF2-40B4-BE49-F238E27FC236}">
-                <a16:creationId xmlns:a16="http://schemas.microsoft.com/office/drawing/2014/main" id="{CFCC33B3-8E90-164F-89A8-78E9217CCC80}"/>
+                <a16:creationId xmlns:a16="http://schemas.microsoft.com/office/drawing/2014/main" id="{E310FBD3-8EF8-1A4D-B6D4-5F684D51BFCA}"/>
               </a:ext>
             </a:extLst>
           </p:cNvPr>
@@ -13685,87 +13311,69 @@
             <p:ph type="title"/>
           </p:nvPr>
         </p:nvSpPr>
-        <p:spPr>
-          <a:xfrm>
-            <a:off x="8160773" y="1113062"/>
-            <a:ext cx="3382297" cy="3281957"/>
-          </a:xfrm>
-        </p:spPr>
+        <p:spPr/>
         <p:txBody>
-          <a:bodyPr vert="horz" lIns="91440" tIns="45720" rIns="91440" bIns="45720" rtlCol="0" anchor="b">
-            <a:normAutofit/>
-          </a:bodyPr>
+          <a:bodyPr/>
           <a:lstStyle/>
           <a:p>
-            <a:pPr>
-              <a:lnSpc>
-                <a:spcPct val="90000"/>
-              </a:lnSpc>
-            </a:pPr>
-            <a:r>
-              <a:rPr lang="en-US" sz="3800" b="0" i="0" kern="1200">
-                <a:solidFill>
-                  <a:srgbClr val="EBEBEB"/>
-                </a:solidFill>
-                <a:latin typeface="+mj-lt"/>
-                <a:ea typeface="+mj-ea"/>
-                <a:cs typeface="+mj-cs"/>
-              </a:rPr>
-              <a:t>Handling Authorization With Hashing</a:t>
+            <a:r>
+              <a:rPr lang="en-US" dirty="0"/>
+              <a:t>Authorization</a:t>
             </a:r>
           </a:p>
         </p:txBody>
       </p:sp>
-      <p:pic>
-        <p:nvPicPr>
-          <p:cNvPr id="22" name="Content Placeholder 21" descr="Text&#10;&#10;Description automatically generated">
+      <p:sp>
+        <p:nvSpPr>
+          <p:cNvPr id="3" name="Content Placeholder 2">
             <a:extLst>
               <a:ext uri="{FF2B5EF4-FFF2-40B4-BE49-F238E27FC236}">
-                <a16:creationId xmlns:a16="http://schemas.microsoft.com/office/drawing/2014/main" id="{B0145DB7-21EF-E94B-AC0F-1FD2C2005874}"/>
+                <a16:creationId xmlns:a16="http://schemas.microsoft.com/office/drawing/2014/main" id="{32992C5A-EA43-E842-AE36-AA9FB51E67FA}"/>
               </a:ext>
             </a:extLst>
           </p:cNvPr>
-          <p:cNvPicPr>
-            <a:picLocks noGrp="1" noChangeAspect="1"/>
-          </p:cNvPicPr>
+          <p:cNvSpPr>
+            <a:spLocks noGrp="1"/>
+          </p:cNvSpPr>
           <p:nvPr>
             <p:ph idx="1"/>
           </p:nvPr>
-        </p:nvPicPr>
-        <p:blipFill>
-          <a:blip r:embed="rId3"/>
-          <a:stretch>
-            <a:fillRect/>
-          </a:stretch>
-        </p:blipFill>
-        <p:spPr>
-          <a:xfrm>
-            <a:off x="1109763" y="1486171"/>
-            <a:ext cx="6470907" cy="3882542"/>
-          </a:xfrm>
-          <a:prstGeom prst="roundRect">
-            <a:avLst>
-              <a:gd name="adj" fmla="val 1858"/>
-            </a:avLst>
-          </a:prstGeom>
-          <a:effectLst>
-            <a:outerShdw blurRad="50800" dist="50800" dir="5400000" algn="tl" rotWithShape="0">
-              <a:srgbClr val="000000">
-                <a:alpha val="43000"/>
-              </a:srgbClr>
-            </a:outerShdw>
-          </a:effectLst>
-        </p:spPr>
-      </p:pic>
+        </p:nvSpPr>
+        <p:spPr/>
+        <p:txBody>
+          <a:bodyPr/>
+          <a:lstStyle/>
+          <a:p>
+            <a:r>
+              <a:rPr lang="en-US" dirty="0"/>
+              <a:t>Validating that a user has the necessary permissions to perform the requested action on the requested resource</a:t>
+            </a:r>
+          </a:p>
+          <a:p>
+            <a:pPr lvl="1"/>
+            <a:r>
+              <a:rPr lang="en-US" dirty="0"/>
+              <a:t>A user may have read permissions, but not write permissions</a:t>
+            </a:r>
+          </a:p>
+          <a:p>
+            <a:pPr lvl="1"/>
+            <a:r>
+              <a:rPr lang="en-US" dirty="0"/>
+              <a:t>A user may not have access to provide other users with access permission</a:t>
+            </a:r>
+          </a:p>
+        </p:txBody>
+      </p:sp>
     </p:spTree>
     <p:extLst>
       <p:ext uri="{BB962C8B-B14F-4D97-AF65-F5344CB8AC3E}">
-        <p14:creationId xmlns:p14="http://schemas.microsoft.com/office/powerpoint/2010/main" val="2764882629"/>
+        <p14:creationId xmlns:p14="http://schemas.microsoft.com/office/powerpoint/2010/main" val="1518037200"/>
       </p:ext>
     </p:extLst>
   </p:cSld>
   <p:clrMapOvr>
-    <a:overrideClrMapping bg1="dk1" tx1="lt1" bg2="dk2" tx2="lt2" accent1="accent1" accent2="accent2" accent3="accent3" accent4="accent4" accent5="accent5" accent6="accent6" hlink="hlink" folHlink="folHlink"/>
+    <a:masterClrMapping/>
   </p:clrMapOvr>
 </p:sld>
 </file>
@@ -19672,6 +19280,14 @@
 <file path=ppt/slides/slide9.xml><?xml version="1.0" encoding="utf-8"?>
 <p:sld xmlns:a="http://schemas.openxmlformats.org/drawingml/2006/main" xmlns:r="http://schemas.openxmlformats.org/officeDocument/2006/relationships" xmlns:p="http://schemas.openxmlformats.org/presentationml/2006/main">
   <p:cSld>
+    <p:bg>
+      <p:bgPr>
+        <a:solidFill>
+          <a:schemeClr val="bg1"/>
+        </a:solidFill>
+        <a:effectLst/>
+      </p:bgPr>
+    </p:bg>
     <p:spTree>
       <p:nvGrpSpPr>
         <p:cNvPr id="1" name=""/>
@@ -19686,12 +19302,378 @@
           <a:chExt cx="0" cy="0"/>
         </a:xfrm>
       </p:grpSpPr>
+      <p:grpSp>
+        <p:nvGrpSpPr>
+          <p:cNvPr id="55" name="Group 54">
+            <a:extLst>
+              <a:ext uri="{FF2B5EF4-FFF2-40B4-BE49-F238E27FC236}">
+                <a16:creationId xmlns:a16="http://schemas.microsoft.com/office/drawing/2014/main" id="{4091D54B-59AB-4A5E-8E9E-0421BD66D4FB}"/>
+              </a:ext>
+              <a:ext uri="{C183D7F6-B498-43B3-948B-1728B52AA6E4}">
+                <adec:decorative xmlns:adec="http://schemas.microsoft.com/office/drawing/2017/decorative" val="1"/>
+              </a:ext>
+            </a:extLst>
+          </p:cNvPr>
+          <p:cNvGrpSpPr>
+            <a:grpSpLocks noGrp="1" noUngrp="1" noRot="1" noChangeAspect="1" noMove="1" noResize="1"/>
+          </p:cNvGrpSpPr>
+          <p:nvPr>
+            <p:extLst>
+              <p:ext uri="{386F3935-93C4-4BCD-93E2-E3B085C9AB24}">
+                <p16:designElem xmlns:p16="http://schemas.microsoft.com/office/powerpoint/2015/main" val="1"/>
+              </p:ext>
+            </p:extLst>
+          </p:nvPr>
+        </p:nvGrpSpPr>
+        <p:grpSpPr>
+          <a:xfrm>
+            <a:off x="0" y="0"/>
+            <a:ext cx="12192000" cy="6858000"/>
+            <a:chOff x="0" y="0"/>
+            <a:chExt cx="12192000" cy="6858000"/>
+          </a:xfrm>
+        </p:grpSpPr>
+        <p:sp>
+          <p:nvSpPr>
+            <p:cNvPr id="56" name="Rectangle 55">
+              <a:extLst>
+                <a:ext uri="{FF2B5EF4-FFF2-40B4-BE49-F238E27FC236}">
+                  <a16:creationId xmlns:a16="http://schemas.microsoft.com/office/drawing/2014/main" id="{547CE62E-FFFD-4A1F-BA78-C3B89C36FCA5}"/>
+                </a:ext>
+                <a:ext uri="{C183D7F6-B498-43B3-948B-1728B52AA6E4}">
+                  <adec:decorative xmlns:adec="http://schemas.microsoft.com/office/drawing/2017/decorative" val="1"/>
+                </a:ext>
+              </a:extLst>
+            </p:cNvPr>
+            <p:cNvSpPr/>
+            <p:nvPr>
+              <p:extLst>
+                <p:ext uri="{386F3935-93C4-4BCD-93E2-E3B085C9AB24}">
+                  <p16:designElem xmlns:p16="http://schemas.microsoft.com/office/powerpoint/2015/main" val="1"/>
+                </p:ext>
+              </p:extLst>
+            </p:nvPr>
+          </p:nvSpPr>
+          <p:spPr>
+            <a:xfrm>
+              <a:off x="0" y="0"/>
+              <a:ext cx="12192000" cy="6858000"/>
+            </a:xfrm>
+            <a:prstGeom prst="rect">
+              <a:avLst/>
+            </a:prstGeom>
+            <a:blipFill>
+              <a:blip r:embed="rId2">
+                <a:duotone>
+                  <a:schemeClr val="dk2">
+                    <a:shade val="69000"/>
+                    <a:hueMod val="91000"/>
+                    <a:satMod val="164000"/>
+                    <a:lumMod val="74000"/>
+                  </a:schemeClr>
+                  <a:schemeClr val="dk2">
+                    <a:hueMod val="124000"/>
+                    <a:satMod val="140000"/>
+                    <a:lumMod val="142000"/>
+                  </a:schemeClr>
+                </a:duotone>
+              </a:blip>
+              <a:stretch>
+                <a:fillRect/>
+              </a:stretch>
+            </a:blipFill>
+            <a:ln>
+              <a:noFill/>
+            </a:ln>
+          </p:spPr>
+          <p:style>
+            <a:lnRef idx="2">
+              <a:schemeClr val="accent1">
+                <a:shade val="50000"/>
+              </a:schemeClr>
+            </a:lnRef>
+            <a:fillRef idx="1">
+              <a:schemeClr val="accent1"/>
+            </a:fillRef>
+            <a:effectRef idx="0">
+              <a:schemeClr val="accent1"/>
+            </a:effectRef>
+            <a:fontRef idx="minor">
+              <a:schemeClr val="lt1"/>
+            </a:fontRef>
+          </p:style>
+        </p:sp>
+        <p:sp>
+          <p:nvSpPr>
+            <p:cNvPr id="57" name="Freeform 5">
+              <a:extLst>
+                <a:ext uri="{FF2B5EF4-FFF2-40B4-BE49-F238E27FC236}">
+                  <a16:creationId xmlns:a16="http://schemas.microsoft.com/office/drawing/2014/main" id="{AE51FD27-6B6A-4D21-BF22-245DA9BD0B3E}"/>
+                </a:ext>
+                <a:ext uri="{C183D7F6-B498-43B3-948B-1728B52AA6E4}">
+                  <adec:decorative xmlns:adec="http://schemas.microsoft.com/office/drawing/2017/decorative" val="1"/>
+                </a:ext>
+              </a:extLst>
+            </p:cNvPr>
+            <p:cNvSpPr>
+              <a:spLocks noEditPoints="1"/>
+            </p:cNvSpPr>
+            <p:nvPr>
+              <p:extLst>
+                <p:ext uri="{386F3935-93C4-4BCD-93E2-E3B085C9AB24}">
+                  <p16:designElem xmlns:p16="http://schemas.microsoft.com/office/powerpoint/2015/main" val="1"/>
+                </p:ext>
+              </p:extLst>
+            </p:nvPr>
+          </p:nvSpPr>
+          <p:spPr bwMode="gray">
+            <a:xfrm>
+              <a:off x="0" y="1587"/>
+              <a:ext cx="12192000" cy="6856413"/>
+            </a:xfrm>
+            <a:custGeom>
+              <a:avLst/>
+              <a:gdLst/>
+              <a:ahLst/>
+              <a:cxnLst/>
+              <a:rect l="0" t="0" r="r" b="b"/>
+              <a:pathLst>
+                <a:path w="15356" h="8638">
+                  <a:moveTo>
+                    <a:pt x="0" y="0"/>
+                  </a:moveTo>
+                  <a:lnTo>
+                    <a:pt x="0" y="8638"/>
+                  </a:lnTo>
+                  <a:lnTo>
+                    <a:pt x="15356" y="8638"/>
+                  </a:lnTo>
+                  <a:lnTo>
+                    <a:pt x="15356" y="0"/>
+                  </a:lnTo>
+                  <a:lnTo>
+                    <a:pt x="0" y="0"/>
+                  </a:lnTo>
+                  <a:close/>
+                  <a:moveTo>
+                    <a:pt x="14748" y="8038"/>
+                  </a:moveTo>
+                  <a:lnTo>
+                    <a:pt x="600" y="8038"/>
+                  </a:lnTo>
+                  <a:lnTo>
+                    <a:pt x="600" y="592"/>
+                  </a:lnTo>
+                  <a:lnTo>
+                    <a:pt x="14748" y="592"/>
+                  </a:lnTo>
+                  <a:lnTo>
+                    <a:pt x="14748" y="8038"/>
+                  </a:lnTo>
+                  <a:close/>
+                </a:path>
+              </a:pathLst>
+            </a:custGeom>
+            <a:solidFill>
+              <a:schemeClr val="bg1"/>
+            </a:solidFill>
+            <a:ln>
+              <a:noFill/>
+            </a:ln>
+          </p:spPr>
+        </p:sp>
+      </p:grpSp>
+      <p:sp>
+        <p:nvSpPr>
+          <p:cNvPr id="59" name="Rectangle 58">
+            <a:extLst>
+              <a:ext uri="{FF2B5EF4-FFF2-40B4-BE49-F238E27FC236}">
+                <a16:creationId xmlns:a16="http://schemas.microsoft.com/office/drawing/2014/main" id="{B8144315-1C5A-4185-A952-25D98D303D46}"/>
+              </a:ext>
+              <a:ext uri="{C183D7F6-B498-43B3-948B-1728B52AA6E4}">
+                <adec:decorative xmlns:adec="http://schemas.microsoft.com/office/drawing/2017/decorative" val="1"/>
+              </a:ext>
+            </a:extLst>
+          </p:cNvPr>
+          <p:cNvSpPr>
+            <a:spLocks noGrp="1" noRot="1" noChangeAspect="1" noMove="1" noResize="1" noEditPoints="1" noAdjustHandles="1" noChangeArrowheads="1" noChangeShapeType="1" noTextEdit="1"/>
+          </p:cNvSpPr>
+          <p:nvPr>
+            <p:extLst>
+              <p:ext uri="{386F3935-93C4-4BCD-93E2-E3B085C9AB24}">
+                <p16:designElem xmlns:p16="http://schemas.microsoft.com/office/powerpoint/2015/main" val="1"/>
+              </p:ext>
+            </p:extLst>
+          </p:nvPr>
+        </p:nvSpPr>
+        <p:spPr>
+          <a:xfrm>
+            <a:off x="10437812" y="0"/>
+            <a:ext cx="685800" cy="1143000"/>
+          </a:xfrm>
+          <a:prstGeom prst="rect">
+            <a:avLst/>
+          </a:prstGeom>
+          <a:solidFill>
+            <a:schemeClr val="accent1"/>
+          </a:solidFill>
+          <a:ln>
+            <a:noFill/>
+          </a:ln>
+        </p:spPr>
+        <p:style>
+          <a:lnRef idx="1">
+            <a:schemeClr val="accent1"/>
+          </a:lnRef>
+          <a:fillRef idx="3">
+            <a:schemeClr val="accent1"/>
+          </a:fillRef>
+          <a:effectRef idx="2">
+            <a:schemeClr val="accent1"/>
+          </a:effectRef>
+          <a:fontRef idx="minor">
+            <a:schemeClr val="lt1"/>
+          </a:fontRef>
+        </p:style>
+      </p:sp>
+      <p:sp>
+        <p:nvSpPr>
+          <p:cNvPr id="61" name="Freeform 5">
+            <a:extLst>
+              <a:ext uri="{FF2B5EF4-FFF2-40B4-BE49-F238E27FC236}">
+                <a16:creationId xmlns:a16="http://schemas.microsoft.com/office/drawing/2014/main" id="{11CAC6F2-0806-417B-BF5D-5AEF6195FA49}"/>
+              </a:ext>
+              <a:ext uri="{C183D7F6-B498-43B3-948B-1728B52AA6E4}">
+                <adec:decorative xmlns:adec="http://schemas.microsoft.com/office/drawing/2017/decorative" val="1"/>
+              </a:ext>
+            </a:extLst>
+          </p:cNvPr>
+          <p:cNvSpPr>
+            <a:spLocks noGrp="1" noRot="1" noChangeAspect="1" noMove="1" noResize="1" noEditPoints="1" noAdjustHandles="1" noChangeArrowheads="1" noChangeShapeType="1" noTextEdit="1"/>
+          </p:cNvSpPr>
+          <p:nvPr>
+            <p:extLst>
+              <p:ext uri="{386F3935-93C4-4BCD-93E2-E3B085C9AB24}">
+                <p16:designElem xmlns:p16="http://schemas.microsoft.com/office/powerpoint/2015/main" val="1"/>
+              </p:ext>
+            </p:extLst>
+          </p:nvPr>
+        </p:nvSpPr>
+        <p:spPr bwMode="gray">
+          <a:xfrm>
+            <a:off x="0" y="1587"/>
+            <a:ext cx="12192000" cy="6856413"/>
+          </a:xfrm>
+          <a:custGeom>
+            <a:avLst/>
+            <a:gdLst/>
+            <a:ahLst/>
+            <a:cxnLst/>
+            <a:rect l="0" t="0" r="r" b="b"/>
+            <a:pathLst>
+              <a:path w="15356" h="8638">
+                <a:moveTo>
+                  <a:pt x="0" y="0"/>
+                </a:moveTo>
+                <a:lnTo>
+                  <a:pt x="0" y="8638"/>
+                </a:lnTo>
+                <a:lnTo>
+                  <a:pt x="15356" y="8638"/>
+                </a:lnTo>
+                <a:lnTo>
+                  <a:pt x="15356" y="0"/>
+                </a:lnTo>
+                <a:lnTo>
+                  <a:pt x="0" y="0"/>
+                </a:lnTo>
+                <a:close/>
+                <a:moveTo>
+                  <a:pt x="14748" y="8038"/>
+                </a:moveTo>
+                <a:lnTo>
+                  <a:pt x="600" y="8038"/>
+                </a:lnTo>
+                <a:lnTo>
+                  <a:pt x="600" y="592"/>
+                </a:lnTo>
+                <a:lnTo>
+                  <a:pt x="14748" y="592"/>
+                </a:lnTo>
+                <a:lnTo>
+                  <a:pt x="14748" y="8038"/>
+                </a:lnTo>
+                <a:close/>
+              </a:path>
+            </a:pathLst>
+          </a:custGeom>
+          <a:solidFill>
+            <a:schemeClr val="tx1"/>
+          </a:solidFill>
+          <a:ln>
+            <a:noFill/>
+          </a:ln>
+        </p:spPr>
+      </p:sp>
+      <p:sp>
+        <p:nvSpPr>
+          <p:cNvPr id="63" name="Rectangle 62">
+            <a:extLst>
+              <a:ext uri="{FF2B5EF4-FFF2-40B4-BE49-F238E27FC236}">
+                <a16:creationId xmlns:a16="http://schemas.microsoft.com/office/drawing/2014/main" id="{D4723B02-0AAB-4F6E-BA41-8ED99D559D93}"/>
+              </a:ext>
+              <a:ext uri="{C183D7F6-B498-43B3-948B-1728B52AA6E4}">
+                <adec:decorative xmlns:adec="http://schemas.microsoft.com/office/drawing/2017/decorative" val="1"/>
+              </a:ext>
+            </a:extLst>
+          </p:cNvPr>
+          <p:cNvSpPr>
+            <a:spLocks noGrp="1" noRot="1" noChangeAspect="1" noMove="1" noResize="1" noEditPoints="1" noAdjustHandles="1" noChangeArrowheads="1" noChangeShapeType="1" noTextEdit="1"/>
+          </p:cNvSpPr>
+          <p:nvPr>
+            <p:extLst>
+              <p:ext uri="{386F3935-93C4-4BCD-93E2-E3B085C9AB24}">
+                <p16:designElem xmlns:p16="http://schemas.microsoft.com/office/powerpoint/2015/main" val="1"/>
+              </p:ext>
+            </p:extLst>
+          </p:nvPr>
+        </p:nvSpPr>
+        <p:spPr>
+          <a:xfrm>
+            <a:off x="10437812" y="0"/>
+            <a:ext cx="685800" cy="1143000"/>
+          </a:xfrm>
+          <a:prstGeom prst="rect">
+            <a:avLst/>
+          </a:prstGeom>
+          <a:solidFill>
+            <a:schemeClr val="accent1"/>
+          </a:solidFill>
+          <a:ln>
+            <a:noFill/>
+          </a:ln>
+        </p:spPr>
+        <p:style>
+          <a:lnRef idx="1">
+            <a:schemeClr val="accent1"/>
+          </a:lnRef>
+          <a:fillRef idx="3">
+            <a:schemeClr val="accent1"/>
+          </a:fillRef>
+          <a:effectRef idx="2">
+            <a:schemeClr val="accent1"/>
+          </a:effectRef>
+          <a:fontRef idx="minor">
+            <a:schemeClr val="lt1"/>
+          </a:fontRef>
+        </p:style>
+      </p:sp>
       <p:sp>
         <p:nvSpPr>
           <p:cNvPr id="2" name="Title 1">
             <a:extLst>
               <a:ext uri="{FF2B5EF4-FFF2-40B4-BE49-F238E27FC236}">
-                <a16:creationId xmlns:a16="http://schemas.microsoft.com/office/drawing/2014/main" id="{E310FBD3-8EF8-1A4D-B6D4-5F684D51BFCA}"/>
+                <a16:creationId xmlns:a16="http://schemas.microsoft.com/office/drawing/2014/main" id="{CFCC33B3-8E90-164F-89A8-78E9217CCC80}"/>
               </a:ext>
             </a:extLst>
           </p:cNvPr>
@@ -19702,69 +19684,87 @@
             <p:ph type="title"/>
           </p:nvPr>
         </p:nvSpPr>
-        <p:spPr/>
+        <p:spPr>
+          <a:xfrm>
+            <a:off x="8160773" y="1113062"/>
+            <a:ext cx="3382297" cy="3281957"/>
+          </a:xfrm>
+        </p:spPr>
         <p:txBody>
-          <a:bodyPr/>
+          <a:bodyPr vert="horz" lIns="91440" tIns="45720" rIns="91440" bIns="45720" rtlCol="0" anchor="b">
+            <a:normAutofit/>
+          </a:bodyPr>
           <a:lstStyle/>
           <a:p>
-            <a:r>
-              <a:rPr lang="en-US" dirty="0"/>
-              <a:t>Authorization</a:t>
+            <a:pPr>
+              <a:lnSpc>
+                <a:spcPct val="90000"/>
+              </a:lnSpc>
+            </a:pPr>
+            <a:r>
+              <a:rPr lang="en-US" sz="3800" b="0" i="0" kern="1200">
+                <a:solidFill>
+                  <a:srgbClr val="EBEBEB"/>
+                </a:solidFill>
+                <a:latin typeface="+mj-lt"/>
+                <a:ea typeface="+mj-ea"/>
+                <a:cs typeface="+mj-cs"/>
+              </a:rPr>
+              <a:t>Handling Authorization With Hashing</a:t>
             </a:r>
           </a:p>
         </p:txBody>
       </p:sp>
-      <p:sp>
-        <p:nvSpPr>
-          <p:cNvPr id="3" name="Content Placeholder 2">
+      <p:pic>
+        <p:nvPicPr>
+          <p:cNvPr id="22" name="Content Placeholder 21" descr="Text&#10;&#10;Description automatically generated">
             <a:extLst>
               <a:ext uri="{FF2B5EF4-FFF2-40B4-BE49-F238E27FC236}">
-                <a16:creationId xmlns:a16="http://schemas.microsoft.com/office/drawing/2014/main" id="{32992C5A-EA43-E842-AE36-AA9FB51E67FA}"/>
+                <a16:creationId xmlns:a16="http://schemas.microsoft.com/office/drawing/2014/main" id="{B0145DB7-21EF-E94B-AC0F-1FD2C2005874}"/>
               </a:ext>
             </a:extLst>
           </p:cNvPr>
-          <p:cNvSpPr>
-            <a:spLocks noGrp="1"/>
-          </p:cNvSpPr>
+          <p:cNvPicPr>
+            <a:picLocks noGrp="1" noChangeAspect="1"/>
+          </p:cNvPicPr>
           <p:nvPr>
             <p:ph idx="1"/>
           </p:nvPr>
-        </p:nvSpPr>
-        <p:spPr/>
-        <p:txBody>
-          <a:bodyPr/>
-          <a:lstStyle/>
-          <a:p>
-            <a:r>
-              <a:rPr lang="en-US" dirty="0"/>
-              <a:t>Validating that a user has the necessary permissions to perform the requested action on the requested resource</a:t>
-            </a:r>
-          </a:p>
-          <a:p>
-            <a:pPr lvl="1"/>
-            <a:r>
-              <a:rPr lang="en-US" dirty="0"/>
-              <a:t>A user may have read permissions, but not write permissions</a:t>
-            </a:r>
-          </a:p>
-          <a:p>
-            <a:pPr lvl="1"/>
-            <a:r>
-              <a:rPr lang="en-US" dirty="0"/>
-              <a:t>A user may not have access to provide other users with access permission</a:t>
-            </a:r>
-          </a:p>
-        </p:txBody>
-      </p:sp>
+        </p:nvPicPr>
+        <p:blipFill>
+          <a:blip r:embed="rId3"/>
+          <a:stretch>
+            <a:fillRect/>
+          </a:stretch>
+        </p:blipFill>
+        <p:spPr>
+          <a:xfrm>
+            <a:off x="1109763" y="1486171"/>
+            <a:ext cx="6470907" cy="3882542"/>
+          </a:xfrm>
+          <a:prstGeom prst="roundRect">
+            <a:avLst>
+              <a:gd name="adj" fmla="val 1858"/>
+            </a:avLst>
+          </a:prstGeom>
+          <a:effectLst>
+            <a:outerShdw blurRad="50800" dist="50800" dir="5400000" algn="tl" rotWithShape="0">
+              <a:srgbClr val="000000">
+                <a:alpha val="43000"/>
+              </a:srgbClr>
+            </a:outerShdw>
+          </a:effectLst>
+        </p:spPr>
+      </p:pic>
     </p:spTree>
     <p:extLst>
       <p:ext uri="{BB962C8B-B14F-4D97-AF65-F5344CB8AC3E}">
-        <p14:creationId xmlns:p14="http://schemas.microsoft.com/office/powerpoint/2010/main" val="1518037200"/>
+        <p14:creationId xmlns:p14="http://schemas.microsoft.com/office/powerpoint/2010/main" val="2764882629"/>
       </p:ext>
     </p:extLst>
   </p:cSld>
   <p:clrMapOvr>
-    <a:masterClrMapping/>
+    <a:overrideClrMapping bg1="dk1" tx1="lt1" bg2="dk2" tx2="lt2" accent1="accent1" accent2="accent2" accent3="accent3" accent4="accent4" accent5="accent5" accent6="accent6" hlink="hlink" folHlink="folHlink"/>
   </p:clrMapOvr>
 </p:sld>
 </file>

</xml_diff>